<commit_message>
1st draft for the documentation
</commit_message>
<xml_diff>
--- a/docs/use-case.pptx
+++ b/docs/use-case.pptx
@@ -3040,7 +3040,7 @@
           <p:cNvPr id="6" name="Graphic 6">
             <a:extLst>
               <a:ext uri="{FF2B5EF4-FFF2-40B4-BE49-F238E27FC236}">
-                <a16:creationId xmlns:a16="http://schemas.microsoft.com/office/drawing/2014/main" xmlns="" id="{09D9F54A-44C4-9F4F-BBC2-E934D29D02A1}"/>
+                <a16:creationId xmlns="" xmlns:a16="http://schemas.microsoft.com/office/drawing/2014/main" id="{09D9F54A-44C4-9F4F-BBC2-E934D29D02A1}"/>
               </a:ext>
             </a:extLst>
           </p:cNvPr>
@@ -3622,7 +3622,7 @@
           <p:cNvPr id="46" name="Graphic 32">
             <a:extLst>
               <a:ext uri="{FF2B5EF4-FFF2-40B4-BE49-F238E27FC236}">
-                <a16:creationId xmlns:a16="http://schemas.microsoft.com/office/drawing/2014/main" xmlns="" id="{0EFA1B4E-1A2B-B148-9D95-B0200D03E58C}"/>
+                <a16:creationId xmlns="" xmlns:a16="http://schemas.microsoft.com/office/drawing/2014/main" id="{0EFA1B4E-1A2B-B148-9D95-B0200D03E58C}"/>
               </a:ext>
             </a:extLst>
           </p:cNvPr>
@@ -3646,7 +3646,7 @@
         </p:blipFill>
         <p:spPr bwMode="auto">
           <a:xfrm>
-            <a:off x="5076056" y="3642626"/>
+            <a:off x="5085181" y="3691829"/>
             <a:ext cx="393480" cy="465271"/>
           </a:xfrm>
           <a:prstGeom prst="rect">
@@ -3661,15 +3661,7 @@
             <a:headEnd/>
             <a:tailEnd/>
           </a:ln>
-          <a:extLst>
-            <a:ext uri="{909E8E84-426E-40DD-AFC4-6F175D3DCCD1}">
-              <a14:hiddenFill xmlns:a14="http://schemas.microsoft.com/office/drawing/2010/main">
-                <a:solidFill>
-                  <a:srgbClr val="FFFFFF"/>
-                </a:solidFill>
-              </a14:hiddenFill>
-            </a:ext>
-          </a:extLst>
+          <a:extLst/>
         </p:spPr>
       </p:pic>
       <p:cxnSp>
@@ -3946,7 +3938,7 @@
           <p:cNvPr id="82" name="Graphic 34">
             <a:extLst>
               <a:ext uri="{FF2B5EF4-FFF2-40B4-BE49-F238E27FC236}">
-                <a16:creationId xmlns:a16="http://schemas.microsoft.com/office/drawing/2014/main" xmlns="" id="{88A1A335-7587-EC4C-9F7C-F20C55AA6835}"/>
+                <a16:creationId xmlns="" xmlns:a16="http://schemas.microsoft.com/office/drawing/2014/main" id="{88A1A335-7587-EC4C-9F7C-F20C55AA6835}"/>
               </a:ext>
             </a:extLst>
           </p:cNvPr>
@@ -3972,6 +3964,137 @@
           <a:xfrm>
             <a:off x="8065104" y="2811853"/>
             <a:ext cx="450359" cy="450359"/>
+          </a:xfrm>
+          <a:prstGeom prst="rect">
+            <a:avLst/>
+          </a:prstGeom>
+          <a:noFill/>
+          <a:ln>
+            <a:noFill/>
+          </a:ln>
+          <a:extLst>
+            <a:ext uri="{909E8E84-426E-40DD-AFC4-6F175D3DCCD1}">
+              <a14:hiddenFill xmlns:a14="http://schemas.microsoft.com/office/drawing/2010/main">
+                <a:solidFill>
+                  <a:srgbClr val="FFFFFF"/>
+                </a:solidFill>
+              </a14:hiddenFill>
+            </a:ext>
+            <a:ext uri="{91240B29-F687-4F45-9708-019B960494DF}">
+              <a14:hiddenLine xmlns:a14="http://schemas.microsoft.com/office/drawing/2010/main" w="9525">
+                <a:solidFill>
+                  <a:srgbClr val="000000"/>
+                </a:solidFill>
+                <a:miter lim="800000"/>
+                <a:headEnd/>
+                <a:tailEnd/>
+              </a14:hiddenLine>
+            </a:ext>
+          </a:extLst>
+        </p:spPr>
+      </p:pic>
+      <p:sp>
+        <p:nvSpPr>
+          <p:cNvPr id="23" name="Textfeld 22"/>
+          <p:cNvSpPr txBox="1"/>
+          <p:nvPr/>
+        </p:nvSpPr>
+        <p:spPr>
+          <a:xfrm>
+            <a:off x="3519685" y="2910136"/>
+            <a:ext cx="1923925" cy="246221"/>
+          </a:xfrm>
+          <a:prstGeom prst="rect">
+            <a:avLst/>
+          </a:prstGeom>
+          <a:noFill/>
+        </p:spPr>
+        <p:txBody>
+          <a:bodyPr wrap="none" rtlCol="0">
+            <a:spAutoFit/>
+          </a:bodyPr>
+          <a:lstStyle/>
+          <a:p>
+            <a:pPr algn="ctr"/>
+            <a:r>
+              <a:rPr lang="de-DE" sz="1000" dirty="0">
+                <a:solidFill>
+                  <a:srgbClr val="C00000"/>
+                </a:solidFill>
+              </a:rPr>
+              <a:t>a</a:t>
+            </a:r>
+            <a:r>
+              <a:rPr lang="de-DE" sz="1000" dirty="0" smtClean="0">
+                <a:solidFill>
+                  <a:srgbClr val="C00000"/>
+                </a:solidFill>
+              </a:rPr>
+              <a:t>ws-</a:t>
+            </a:r>
+            <a:r>
+              <a:rPr lang="de-DE" sz="1000" dirty="0" err="1" smtClean="0">
+                <a:solidFill>
+                  <a:srgbClr val="C00000"/>
+                </a:solidFill>
+              </a:rPr>
+              <a:t>provisioned</a:t>
+            </a:r>
+            <a:r>
+              <a:rPr lang="de-DE" sz="1000" dirty="0" smtClean="0">
+                <a:solidFill>
+                  <a:srgbClr val="C00000"/>
+                </a:solidFill>
+              </a:rPr>
+              <a:t>-</a:t>
+            </a:r>
+            <a:r>
+              <a:rPr lang="de-DE" sz="1000" dirty="0" err="1" smtClean="0">
+                <a:solidFill>
+                  <a:srgbClr val="C00000"/>
+                </a:solidFill>
+              </a:rPr>
+              <a:t>parameters.json</a:t>
+            </a:r>
+            <a:endParaRPr lang="de-DE" sz="1000" dirty="0">
+              <a:solidFill>
+                <a:srgbClr val="C00000"/>
+              </a:solidFill>
+            </a:endParaRPr>
+          </a:p>
+        </p:txBody>
+      </p:sp>
+      <p:pic>
+        <p:nvPicPr>
+          <p:cNvPr id="24" name="Graphic 49">
+            <a:extLst>
+              <a:ext uri="{FF2B5EF4-FFF2-40B4-BE49-F238E27FC236}">
+                <a16:creationId xmlns:a16="http://schemas.microsoft.com/office/drawing/2014/main" xmlns="" id="{5A8C48C1-32E1-C747-BB4B-5E3B849CF7A7}"/>
+              </a:ext>
+            </a:extLst>
+          </p:cNvPr>
+          <p:cNvPicPr>
+            <a:picLocks noChangeAspect="1" noChangeArrowheads="1"/>
+          </p:cNvPicPr>
+          <p:nvPr/>
+        </p:nvPicPr>
+        <p:blipFill>
+          <a:blip r:embed="rId11" cstate="print">
+            <a:extLst>
+              <a:ext uri="{28A0092B-C50C-407E-A947-70E740481C1C}">
+                <a14:useLocalDpi xmlns:a14="http://schemas.microsoft.com/office/drawing/2010/main" val="0"/>
+              </a:ext>
+            </a:extLst>
+          </a:blip>
+          <a:srcRect/>
+          <a:stretch>
+            <a:fillRect/>
+          </a:stretch>
+        </p:blipFill>
+        <p:spPr bwMode="auto">
+          <a:xfrm>
+            <a:off x="5250061" y="2373710"/>
+            <a:ext cx="457200" cy="457200"/>
           </a:xfrm>
           <a:prstGeom prst="rect">
             <a:avLst/>

</xml_diff>